<commit_message>
Presentation outline; fresh analysis results
</commit_message>
<xml_diff>
--- a/Documents/Presentation/Presentation Outline.pptx
+++ b/Documents/Presentation/Presentation Outline.pptx
@@ -224,7 +224,7 @@
           <a:p>
             <a:fld id="{40BC3938-7338-4383-8557-333A40433B41}" type="datetimeFigureOut">
               <a:rPr lang="en-GB" smtClean="0"/>
-              <a:t>09/03/2023</a:t>
+              <a:t>10/03/2023</a:t>
             </a:fld>
             <a:endParaRPr lang="en-GB"/>
           </a:p>
@@ -2026,7 +2026,7 @@
           <a:p>
             <a:fld id="{D2420793-031C-4ADB-A567-DC1F189C180B}" type="datetimeFigureOut">
               <a:rPr lang="en-GB" smtClean="0"/>
-              <a:t>09/03/2023</a:t>
+              <a:t>10/03/2023</a:t>
             </a:fld>
             <a:endParaRPr lang="en-GB"/>
           </a:p>
@@ -2277,7 +2277,7 @@
           <a:p>
             <a:fld id="{D2420793-031C-4ADB-A567-DC1F189C180B}" type="datetimeFigureOut">
               <a:rPr lang="en-GB" smtClean="0"/>
-              <a:t>09/03/2023</a:t>
+              <a:t>10/03/2023</a:t>
             </a:fld>
             <a:endParaRPr lang="en-GB"/>
           </a:p>
@@ -2591,7 +2591,7 @@
           <a:p>
             <a:fld id="{D2420793-031C-4ADB-A567-DC1F189C180B}" type="datetimeFigureOut">
               <a:rPr lang="en-GB" smtClean="0"/>
-              <a:t>09/03/2023</a:t>
+              <a:t>10/03/2023</a:t>
             </a:fld>
             <a:endParaRPr lang="en-GB"/>
           </a:p>
@@ -2932,7 +2932,7 @@
           <a:p>
             <a:fld id="{D2420793-031C-4ADB-A567-DC1F189C180B}" type="datetimeFigureOut">
               <a:rPr lang="en-GB" smtClean="0"/>
-              <a:t>09/03/2023</a:t>
+              <a:t>10/03/2023</a:t>
             </a:fld>
             <a:endParaRPr lang="en-GB"/>
           </a:p>
@@ -3246,7 +3246,7 @@
           <a:p>
             <a:fld id="{D2420793-031C-4ADB-A567-DC1F189C180B}" type="datetimeFigureOut">
               <a:rPr lang="en-GB" smtClean="0"/>
-              <a:t>09/03/2023</a:t>
+              <a:t>10/03/2023</a:t>
             </a:fld>
             <a:endParaRPr lang="en-GB"/>
           </a:p>
@@ -3639,7 +3639,7 @@
           <a:p>
             <a:fld id="{D2420793-031C-4ADB-A567-DC1F189C180B}" type="datetimeFigureOut">
               <a:rPr lang="en-GB" smtClean="0"/>
-              <a:t>09/03/2023</a:t>
+              <a:t>10/03/2023</a:t>
             </a:fld>
             <a:endParaRPr lang="en-GB"/>
           </a:p>
@@ -3809,7 +3809,7 @@
           <a:p>
             <a:fld id="{D2420793-031C-4ADB-A567-DC1F189C180B}" type="datetimeFigureOut">
               <a:rPr lang="en-GB" smtClean="0"/>
-              <a:t>09/03/2023</a:t>
+              <a:t>10/03/2023</a:t>
             </a:fld>
             <a:endParaRPr lang="en-GB"/>
           </a:p>
@@ -3989,7 +3989,7 @@
           <a:p>
             <a:fld id="{D2420793-031C-4ADB-A567-DC1F189C180B}" type="datetimeFigureOut">
               <a:rPr lang="en-GB" smtClean="0"/>
-              <a:t>09/03/2023</a:t>
+              <a:t>10/03/2023</a:t>
             </a:fld>
             <a:endParaRPr lang="en-GB"/>
           </a:p>
@@ -4165,7 +4165,7 @@
           <a:p>
             <a:fld id="{D2420793-031C-4ADB-A567-DC1F189C180B}" type="datetimeFigureOut">
               <a:rPr lang="en-GB" smtClean="0"/>
-              <a:t>09/03/2023</a:t>
+              <a:t>10/03/2023</a:t>
             </a:fld>
             <a:endParaRPr lang="en-GB"/>
           </a:p>
@@ -4412,7 +4412,7 @@
           <a:p>
             <a:fld id="{D2420793-031C-4ADB-A567-DC1F189C180B}" type="datetimeFigureOut">
               <a:rPr lang="en-GB" smtClean="0"/>
-              <a:t>09/03/2023</a:t>
+              <a:t>10/03/2023</a:t>
             </a:fld>
             <a:endParaRPr lang="en-GB"/>
           </a:p>
@@ -4644,7 +4644,7 @@
           <a:p>
             <a:fld id="{D2420793-031C-4ADB-A567-DC1F189C180B}" type="datetimeFigureOut">
               <a:rPr lang="en-GB" smtClean="0"/>
-              <a:t>09/03/2023</a:t>
+              <a:t>10/03/2023</a:t>
             </a:fld>
             <a:endParaRPr lang="en-GB"/>
           </a:p>
@@ -5018,7 +5018,7 @@
           <a:p>
             <a:fld id="{D2420793-031C-4ADB-A567-DC1F189C180B}" type="datetimeFigureOut">
               <a:rPr lang="en-GB" smtClean="0"/>
-              <a:t>09/03/2023</a:t>
+              <a:t>10/03/2023</a:t>
             </a:fld>
             <a:endParaRPr lang="en-GB"/>
           </a:p>
@@ -5141,7 +5141,7 @@
           <a:p>
             <a:fld id="{D2420793-031C-4ADB-A567-DC1F189C180B}" type="datetimeFigureOut">
               <a:rPr lang="en-GB" smtClean="0"/>
-              <a:t>09/03/2023</a:t>
+              <a:t>10/03/2023</a:t>
             </a:fld>
             <a:endParaRPr lang="en-GB"/>
           </a:p>
@@ -5236,7 +5236,7 @@
           <a:p>
             <a:fld id="{D2420793-031C-4ADB-A567-DC1F189C180B}" type="datetimeFigureOut">
               <a:rPr lang="en-GB" smtClean="0"/>
-              <a:t>09/03/2023</a:t>
+              <a:t>10/03/2023</a:t>
             </a:fld>
             <a:endParaRPr lang="en-GB"/>
           </a:p>
@@ -5491,7 +5491,7 @@
           <a:p>
             <a:fld id="{D2420793-031C-4ADB-A567-DC1F189C180B}" type="datetimeFigureOut">
               <a:rPr lang="en-GB" smtClean="0"/>
-              <a:t>09/03/2023</a:t>
+              <a:t>10/03/2023</a:t>
             </a:fld>
             <a:endParaRPr lang="en-GB"/>
           </a:p>
@@ -5754,7 +5754,7 @@
           <a:p>
             <a:fld id="{D2420793-031C-4ADB-A567-DC1F189C180B}" type="datetimeFigureOut">
               <a:rPr lang="en-GB" smtClean="0"/>
-              <a:t>09/03/2023</a:t>
+              <a:t>10/03/2023</a:t>
             </a:fld>
             <a:endParaRPr lang="en-GB"/>
           </a:p>
@@ -6497,7 +6497,7 @@
           <a:p>
             <a:fld id="{D2420793-031C-4ADB-A567-DC1F189C180B}" type="datetimeFigureOut">
               <a:rPr lang="en-GB" smtClean="0"/>
-              <a:t>09/03/2023</a:t>
+              <a:t>10/03/2023</a:t>
             </a:fld>
             <a:endParaRPr lang="en-GB"/>
           </a:p>
@@ -13959,13 +13959,25 @@
           <a:p>
             <a:r>
               <a:rPr lang="en-GB" dirty="0"/>
-              <a:t>Task Formulation:</a:t>
+              <a:t>Task Formulation</a:t>
             </a:r>
           </a:p>
           <a:p>
             <a:r>
               <a:rPr lang="en-GB" dirty="0"/>
-              <a:t>Disjoint vs Blurry:</a:t>
+              <a:t>Disjoint vs Blurry</a:t>
+            </a:r>
+          </a:p>
+          <a:p>
+            <a:r>
+              <a:rPr lang="en-GB" dirty="0"/>
+              <a:t>Online vs Offline</a:t>
+            </a:r>
+          </a:p>
+          <a:p>
+            <a:r>
+              <a:rPr lang="en-GB" dirty="0"/>
+              <a:t>Task-IL vs Class-IL</a:t>
             </a:r>
           </a:p>
         </p:txBody>

</xml_diff>